<commit_message>
fixed postgresql poster bug and uploading template report and fixed presentation
</commit_message>
<xml_diff>
--- a/common/(presentation_temp_file).pptx
+++ b/common/(presentation_temp_file).pptx
@@ -5,7 +5,7 @@
     <p:sldMasterId id="2147483964" r:id="rId1"/>
   </p:sldMasterIdLst>
   <p:notesMasterIdLst>
-    <p:notesMasterId r:id="rId18"/>
+    <p:notesMasterId r:id="rId26"/>
   </p:notesMasterIdLst>
   <p:sldIdLst>
     <p:sldId id="256" r:id="rId2"/>
@@ -13,17 +13,25 @@
     <p:sldId id="273" r:id="rId4"/>
     <p:sldId id="258" r:id="rId5"/>
     <p:sldId id="341" r:id="rId6"/>
-    <p:sldId id="274" r:id="rId7"/>
-    <p:sldId id="342" r:id="rId8"/>
-    <p:sldId id="343" r:id="rId9"/>
-    <p:sldId id="344" r:id="rId10"/>
-    <p:sldId id="345" r:id="rId11"/>
-    <p:sldId id="346" r:id="rId12"/>
-    <p:sldId id="347" r:id="rId13"/>
-    <p:sldId id="299" r:id="rId14"/>
-    <p:sldId id="317" r:id="rId15"/>
-    <p:sldId id="337" r:id="rId16"/>
-    <p:sldId id="262" r:id="rId17"/>
+    <p:sldId id="348" r:id="rId7"/>
+    <p:sldId id="274" r:id="rId8"/>
+    <p:sldId id="354" r:id="rId9"/>
+    <p:sldId id="355" r:id="rId10"/>
+    <p:sldId id="342" r:id="rId11"/>
+    <p:sldId id="343" r:id="rId12"/>
+    <p:sldId id="356" r:id="rId13"/>
+    <p:sldId id="357" r:id="rId14"/>
+    <p:sldId id="344" r:id="rId15"/>
+    <p:sldId id="345" r:id="rId16"/>
+    <p:sldId id="352" r:id="rId17"/>
+    <p:sldId id="358" r:id="rId18"/>
+    <p:sldId id="346" r:id="rId19"/>
+    <p:sldId id="347" r:id="rId20"/>
+    <p:sldId id="359" r:id="rId21"/>
+    <p:sldId id="299" r:id="rId22"/>
+    <p:sldId id="317" r:id="rId23"/>
+    <p:sldId id="337" r:id="rId24"/>
+    <p:sldId id="262" r:id="rId25"/>
   </p:sldIdLst>
   <p:sldSz cx="12192000" cy="6858000"/>
   <p:notesSz cx="6858000" cy="9144000"/>
@@ -135,30 +143,38 @@
             <p14:sldId id="259"/>
             <p14:sldId id="273"/>
             <p14:sldId id="258"/>
+            <p14:sldId id="341"/>
           </p14:sldIdLst>
         </p14:section>
-        <p14:section name="Extract" id="{5A82E57F-FAF3-4B12-930E-E24CBC09F95C}">
+        <p14:section name="Approach 1" id="{5A82E57F-FAF3-4B12-930E-E24CBC09F95C}">
           <p14:sldIdLst>
-            <p14:sldId id="341"/>
+            <p14:sldId id="348"/>
             <p14:sldId id="274"/>
+            <p14:sldId id="354"/>
+            <p14:sldId id="355"/>
           </p14:sldIdLst>
         </p14:section>
-        <p14:section name="Transform" id="{4FC5B730-411F-4186-90E8-1BF9E4959108}">
+        <p14:section name="Approach 2" id="{4FC5B730-411F-4186-90E8-1BF9E4959108}">
           <p14:sldIdLst>
             <p14:sldId id="342"/>
             <p14:sldId id="343"/>
+            <p14:sldId id="356"/>
+            <p14:sldId id="357"/>
           </p14:sldIdLst>
         </p14:section>
-        <p14:section name="Load" id="{171D3F0E-BE24-453F-B278-F065D3438591}">
+        <p14:section name="Approach 3" id="{171D3F0E-BE24-453F-B278-F065D3438591}">
           <p14:sldIdLst>
             <p14:sldId id="344"/>
             <p14:sldId id="345"/>
+            <p14:sldId id="352"/>
+            <p14:sldId id="358"/>
           </p14:sldIdLst>
         </p14:section>
-        <p14:section name="(analysis?)" id="{379F2DD4-0BE2-4E0A-BF25-CE7EBDA1B36E}">
+        <p14:section name="Analysis" id="{379F2DD4-0BE2-4E0A-BF25-CE7EBDA1B36E}">
           <p14:sldIdLst>
             <p14:sldId id="346"/>
             <p14:sldId id="347"/>
+            <p14:sldId id="359"/>
           </p14:sldIdLst>
         </p14:section>
         <p14:section name="Closing" id="{93B28E02-08B4-4F83-9D9F-52AD275E17B5}">
@@ -301,7 +317,7 @@
           <a:p>
             <a:fld id="{933732E8-A8D3-42E3-9091-0D3F68185416}" type="datetimeFigureOut">
               <a:rPr lang="en-US" smtClean="0"/>
-              <a:t>2/22/2021</a:t>
+              <a:t>2/24/2021</a:t>
             </a:fld>
             <a:endParaRPr lang="en-US"/>
           </a:p>
@@ -1290,7 +1306,7 @@
           <a:p>
             <a:fld id="{177B7763-22E3-42ED-9DA4-4BF6C8EED420}" type="datetimeFigureOut">
               <a:rPr lang="en-US" smtClean="0"/>
-              <a:t>2/22/2021</a:t>
+              <a:t>2/24/2021</a:t>
             </a:fld>
             <a:endParaRPr lang="en-US"/>
           </a:p>
@@ -1541,7 +1557,7 @@
           <a:p>
             <a:fld id="{177B7763-22E3-42ED-9DA4-4BF6C8EED420}" type="datetimeFigureOut">
               <a:rPr lang="en-US" smtClean="0"/>
-              <a:t>2/22/2021</a:t>
+              <a:t>2/24/2021</a:t>
             </a:fld>
             <a:endParaRPr lang="en-US"/>
           </a:p>
@@ -1855,7 +1871,7 @@
           <a:p>
             <a:fld id="{177B7763-22E3-42ED-9DA4-4BF6C8EED420}" type="datetimeFigureOut">
               <a:rPr lang="en-US" smtClean="0"/>
-              <a:t>2/22/2021</a:t>
+              <a:t>2/24/2021</a:t>
             </a:fld>
             <a:endParaRPr lang="en-US"/>
           </a:p>
@@ -2196,7 +2212,7 @@
           <a:p>
             <a:fld id="{177B7763-22E3-42ED-9DA4-4BF6C8EED420}" type="datetimeFigureOut">
               <a:rPr lang="en-US" smtClean="0"/>
-              <a:t>2/22/2021</a:t>
+              <a:t>2/24/2021</a:t>
             </a:fld>
             <a:endParaRPr lang="en-US"/>
           </a:p>
@@ -2510,7 +2526,7 @@
           <a:p>
             <a:fld id="{177B7763-22E3-42ED-9DA4-4BF6C8EED420}" type="datetimeFigureOut">
               <a:rPr lang="en-US" smtClean="0"/>
-              <a:t>2/22/2021</a:t>
+              <a:t>2/24/2021</a:t>
             </a:fld>
             <a:endParaRPr lang="en-US"/>
           </a:p>
@@ -2903,7 +2919,7 @@
           <a:p>
             <a:fld id="{177B7763-22E3-42ED-9DA4-4BF6C8EED420}" type="datetimeFigureOut">
               <a:rPr lang="en-US" smtClean="0"/>
-              <a:t>2/22/2021</a:t>
+              <a:t>2/24/2021</a:t>
             </a:fld>
             <a:endParaRPr lang="en-US"/>
           </a:p>
@@ -3073,7 +3089,7 @@
           <a:p>
             <a:fld id="{177B7763-22E3-42ED-9DA4-4BF6C8EED420}" type="datetimeFigureOut">
               <a:rPr lang="en-US" smtClean="0"/>
-              <a:t>2/22/2021</a:t>
+              <a:t>2/24/2021</a:t>
             </a:fld>
             <a:endParaRPr lang="en-US"/>
           </a:p>
@@ -3253,7 +3269,7 @@
           <a:p>
             <a:fld id="{177B7763-22E3-42ED-9DA4-4BF6C8EED420}" type="datetimeFigureOut">
               <a:rPr lang="en-US" smtClean="0"/>
-              <a:t>2/22/2021</a:t>
+              <a:t>2/24/2021</a:t>
             </a:fld>
             <a:endParaRPr lang="en-US"/>
           </a:p>
@@ -3429,7 +3445,7 @@
           <a:p>
             <a:fld id="{177B7763-22E3-42ED-9DA4-4BF6C8EED420}" type="datetimeFigureOut">
               <a:rPr lang="en-US" smtClean="0"/>
-              <a:t>2/22/2021</a:t>
+              <a:t>2/24/2021</a:t>
             </a:fld>
             <a:endParaRPr lang="en-US"/>
           </a:p>
@@ -3676,7 +3692,7 @@
           <a:p>
             <a:fld id="{177B7763-22E3-42ED-9DA4-4BF6C8EED420}" type="datetimeFigureOut">
               <a:rPr lang="en-US" smtClean="0"/>
-              <a:t>2/22/2021</a:t>
+              <a:t>2/24/2021</a:t>
             </a:fld>
             <a:endParaRPr lang="en-US"/>
           </a:p>
@@ -3908,7 +3924,7 @@
           <a:p>
             <a:fld id="{177B7763-22E3-42ED-9DA4-4BF6C8EED420}" type="datetimeFigureOut">
               <a:rPr lang="en-US" smtClean="0"/>
-              <a:t>2/22/2021</a:t>
+              <a:t>2/24/2021</a:t>
             </a:fld>
             <a:endParaRPr lang="en-US"/>
           </a:p>
@@ -4282,7 +4298,7 @@
           <a:p>
             <a:fld id="{177B7763-22E3-42ED-9DA4-4BF6C8EED420}" type="datetimeFigureOut">
               <a:rPr lang="en-US" smtClean="0"/>
-              <a:t>2/22/2021</a:t>
+              <a:t>2/24/2021</a:t>
             </a:fld>
             <a:endParaRPr lang="en-US"/>
           </a:p>
@@ -4405,7 +4421,7 @@
           <a:p>
             <a:fld id="{177B7763-22E3-42ED-9DA4-4BF6C8EED420}" type="datetimeFigureOut">
               <a:rPr lang="en-US" smtClean="0"/>
-              <a:t>2/22/2021</a:t>
+              <a:t>2/24/2021</a:t>
             </a:fld>
             <a:endParaRPr lang="en-US"/>
           </a:p>
@@ -4500,7 +4516,7 @@
           <a:p>
             <a:fld id="{177B7763-22E3-42ED-9DA4-4BF6C8EED420}" type="datetimeFigureOut">
               <a:rPr lang="en-US" smtClean="0"/>
-              <a:t>2/22/2021</a:t>
+              <a:t>2/24/2021</a:t>
             </a:fld>
             <a:endParaRPr lang="en-US"/>
           </a:p>
@@ -4755,7 +4771,7 @@
           <a:p>
             <a:fld id="{177B7763-22E3-42ED-9DA4-4BF6C8EED420}" type="datetimeFigureOut">
               <a:rPr lang="en-US" smtClean="0"/>
-              <a:t>2/22/2021</a:t>
+              <a:t>2/24/2021</a:t>
             </a:fld>
             <a:endParaRPr lang="en-US"/>
           </a:p>
@@ -5018,7 +5034,7 @@
           <a:p>
             <a:fld id="{177B7763-22E3-42ED-9DA4-4BF6C8EED420}" type="datetimeFigureOut">
               <a:rPr lang="en-US" smtClean="0"/>
-              <a:t>2/22/2021</a:t>
+              <a:t>2/24/2021</a:t>
             </a:fld>
             <a:endParaRPr lang="en-US"/>
           </a:p>
@@ -5761,7 +5777,7 @@
           <a:p>
             <a:fld id="{177B7763-22E3-42ED-9DA4-4BF6C8EED420}" type="datetimeFigureOut">
               <a:rPr lang="en-US" smtClean="0"/>
-              <a:t>2/22/2021</a:t>
+              <a:t>2/24/2021</a:t>
             </a:fld>
             <a:endParaRPr lang="en-US"/>
           </a:p>
@@ -6304,7 +6320,7 @@
         <p:spPr>
           <a:xfrm>
             <a:off x="856293" y="362030"/>
-            <a:ext cx="6559963" cy="2616199"/>
+            <a:ext cx="8971288" cy="2616199"/>
           </a:xfrm>
         </p:spPr>
         <p:txBody>
@@ -6313,8 +6329,8 @@
           <a:p>
             <a:pPr algn="l"/>
             <a:r>
-              <a:rPr lang="en-US" dirty="0"/>
-              <a:t>TITLE HERE</a:t>
+              <a:rPr lang="en-US" sz="4000" dirty="0"/>
+              <a:t>On Deciding if We Like the Stock, Too</a:t>
             </a:r>
           </a:p>
         </p:txBody>
@@ -6704,7 +6720,7 @@
           <p:cNvPr id="2" name="Title 1">
             <a:extLst>
               <a:ext uri="{FF2B5EF4-FFF2-40B4-BE49-F238E27FC236}">
-                <a16:creationId xmlns:a16="http://schemas.microsoft.com/office/drawing/2014/main" id="{DF2314C0-5399-49F6-8AD6-87EDDFF32150}"/>
+                <a16:creationId xmlns:a16="http://schemas.microsoft.com/office/drawing/2014/main" id="{1CD77767-1B4D-41A7-973F-7135FBE63F75}"/>
               </a:ext>
             </a:extLst>
           </p:cNvPr>
@@ -6717,33 +6733,33 @@
         </p:nvSpPr>
         <p:spPr>
           <a:xfrm>
-            <a:off x="1577075" y="162340"/>
-            <a:ext cx="10018713" cy="559904"/>
+            <a:off x="1630624" y="373023"/>
+            <a:ext cx="8930747" cy="936488"/>
           </a:xfrm>
         </p:spPr>
         <p:txBody>
-          <a:bodyPr>
-            <a:normAutofit/>
+          <a:bodyPr anchor="t">
+            <a:noAutofit/>
           </a:bodyPr>
           <a:lstStyle/>
           <a:p>
             <a:pPr algn="l"/>
             <a:r>
-              <a:rPr lang="en-US" sz="2400" dirty="0">
+              <a:rPr lang="en-US" sz="2800" dirty="0">
                 <a:latin typeface="Calibri" panose="020F0502020204030204" pitchFamily="34" charset="0"/>
               </a:rPr>
-              <a:t>Extracting</a:t>
-            </a:r>
-            <a:endParaRPr lang="en-US" sz="2400" dirty="0"/>
-          </a:p>
-        </p:txBody>
-      </p:sp>
-      <p:sp>
-        <p:nvSpPr>
-          <p:cNvPr id="3" name="Content Placeholder 2">
+              <a:t>Approach 2</a:t>
+            </a:r>
+            <a:endParaRPr lang="en-US" sz="2800" dirty="0"/>
+          </a:p>
+        </p:txBody>
+      </p:sp>
+      <p:sp>
+        <p:nvSpPr>
+          <p:cNvPr id="3" name="Text Placeholder 2">
             <a:extLst>
               <a:ext uri="{FF2B5EF4-FFF2-40B4-BE49-F238E27FC236}">
-                <a16:creationId xmlns:a16="http://schemas.microsoft.com/office/drawing/2014/main" id="{24420B42-4123-42C4-A3EE-B8CED6810E04}"/>
+                <a16:creationId xmlns:a16="http://schemas.microsoft.com/office/drawing/2014/main" id="{23F62359-DE82-4A1D-9D06-C5B2423B7694}"/>
               </a:ext>
             </a:extLst>
           </p:cNvPr>
@@ -6751,24 +6767,26 @@
             <a:spLocks noGrp="1"/>
           </p:cNvSpPr>
           <p:nvPr>
-            <p:ph idx="1"/>
+            <p:ph type="body" idx="1"/>
           </p:nvPr>
         </p:nvSpPr>
         <p:spPr>
           <a:xfrm>
-            <a:off x="1577075" y="1249920"/>
-            <a:ext cx="10018713" cy="4358159"/>
+            <a:off x="1630624" y="2348089"/>
+            <a:ext cx="8930747" cy="3200400"/>
           </a:xfrm>
         </p:spPr>
         <p:txBody>
-          <a:bodyPr>
-            <a:normAutofit/>
-          </a:bodyPr>
-          <a:lstStyle/>
-          <a:p>
+          <a:bodyPr anchor="ctr"/>
+          <a:lstStyle/>
+          <a:p>
+            <a:pPr marL="342900" indent="-342900" algn="l">
+              <a:buFont typeface="Arial" panose="020B0604020202020204" pitchFamily="34" charset="0"/>
+              <a:buChar char="•"/>
+            </a:pPr>
             <a:r>
               <a:rPr lang="en-US" dirty="0"/>
-              <a:t>INFO ON EXTRACTING</a:t>
+              <a:t>CONTENT HERE</a:t>
             </a:r>
           </a:p>
         </p:txBody>
@@ -6776,7 +6794,7 @@
     </p:spTree>
     <p:extLst>
       <p:ext uri="{BB962C8B-B14F-4D97-AF65-F5344CB8AC3E}">
-        <p14:creationId xmlns:p14="http://schemas.microsoft.com/office/powerpoint/2010/main" val="1991003054"/>
+        <p14:creationId xmlns:p14="http://schemas.microsoft.com/office/powerpoint/2010/main" val="2799158175"/>
       </p:ext>
     </p:extLst>
   </p:cSld>
@@ -6808,7 +6826,7 @@
           <p:cNvPr id="2" name="Title 1">
             <a:extLst>
               <a:ext uri="{FF2B5EF4-FFF2-40B4-BE49-F238E27FC236}">
-                <a16:creationId xmlns:a16="http://schemas.microsoft.com/office/drawing/2014/main" id="{1CD77767-1B4D-41A7-973F-7135FBE63F75}"/>
+                <a16:creationId xmlns:a16="http://schemas.microsoft.com/office/drawing/2014/main" id="{DF2314C0-5399-49F6-8AD6-87EDDFF32150}"/>
               </a:ext>
             </a:extLst>
           </p:cNvPr>
@@ -6821,33 +6839,33 @@
         </p:nvSpPr>
         <p:spPr>
           <a:xfrm>
-            <a:off x="1630624" y="373023"/>
-            <a:ext cx="8930747" cy="936488"/>
+            <a:off x="1577075" y="162340"/>
+            <a:ext cx="10018713" cy="559904"/>
           </a:xfrm>
         </p:spPr>
         <p:txBody>
-          <a:bodyPr anchor="t">
-            <a:noAutofit/>
+          <a:bodyPr>
+            <a:normAutofit/>
           </a:bodyPr>
           <a:lstStyle/>
           <a:p>
             <a:pPr algn="l"/>
             <a:r>
-              <a:rPr lang="en-US" sz="2800" dirty="0">
+              <a:rPr lang="en-US" sz="2400" dirty="0">
                 <a:latin typeface="Calibri" panose="020F0502020204030204" pitchFamily="34" charset="0"/>
               </a:rPr>
-              <a:t>Extracting</a:t>
-            </a:r>
-            <a:endParaRPr lang="en-US" sz="2800" dirty="0"/>
-          </a:p>
-        </p:txBody>
-      </p:sp>
-      <p:sp>
-        <p:nvSpPr>
-          <p:cNvPr id="3" name="Text Placeholder 2">
+              <a:t>Approach 2 - Extracting</a:t>
+            </a:r>
+            <a:endParaRPr lang="en-US" sz="2400" dirty="0"/>
+          </a:p>
+        </p:txBody>
+      </p:sp>
+      <p:sp>
+        <p:nvSpPr>
+          <p:cNvPr id="3" name="Content Placeholder 2">
             <a:extLst>
               <a:ext uri="{FF2B5EF4-FFF2-40B4-BE49-F238E27FC236}">
-                <a16:creationId xmlns:a16="http://schemas.microsoft.com/office/drawing/2014/main" id="{23F62359-DE82-4A1D-9D06-C5B2423B7694}"/>
+                <a16:creationId xmlns:a16="http://schemas.microsoft.com/office/drawing/2014/main" id="{24420B42-4123-42C4-A3EE-B8CED6810E04}"/>
               </a:ext>
             </a:extLst>
           </p:cNvPr>
@@ -6855,26 +6873,24 @@
             <a:spLocks noGrp="1"/>
           </p:cNvSpPr>
           <p:nvPr>
-            <p:ph type="body" idx="1"/>
+            <p:ph idx="1"/>
           </p:nvPr>
         </p:nvSpPr>
         <p:spPr>
           <a:xfrm>
-            <a:off x="1630624" y="2348089"/>
-            <a:ext cx="8930747" cy="3200400"/>
+            <a:off x="1577075" y="1249920"/>
+            <a:ext cx="10018713" cy="4358159"/>
           </a:xfrm>
         </p:spPr>
         <p:txBody>
-          <a:bodyPr anchor="ctr"/>
-          <a:lstStyle/>
-          <a:p>
-            <a:pPr marL="342900" indent="-342900" algn="l">
-              <a:buFont typeface="Arial" panose="020B0604020202020204" pitchFamily="34" charset="0"/>
-              <a:buChar char="•"/>
-            </a:pPr>
+          <a:bodyPr>
+            <a:normAutofit/>
+          </a:bodyPr>
+          <a:lstStyle/>
+          <a:p>
             <a:r>
               <a:rPr lang="en-US" dirty="0"/>
-              <a:t>CONTENT HERE</a:t>
+              <a:t>INFO ON EXTRACTING</a:t>
             </a:r>
           </a:p>
         </p:txBody>
@@ -6882,7 +6898,7 @@
     </p:spTree>
     <p:extLst>
       <p:ext uri="{BB962C8B-B14F-4D97-AF65-F5344CB8AC3E}">
-        <p14:creationId xmlns:p14="http://schemas.microsoft.com/office/powerpoint/2010/main" val="16188636"/>
+        <p14:creationId xmlns:p14="http://schemas.microsoft.com/office/powerpoint/2010/main" val="3951995029"/>
       </p:ext>
     </p:extLst>
   </p:cSld>
@@ -6942,7 +6958,745 @@
               <a:rPr lang="en-US" sz="2400" dirty="0">
                 <a:latin typeface="Calibri" panose="020F0502020204030204" pitchFamily="34" charset="0"/>
               </a:rPr>
-              <a:t>Extracting</a:t>
+              <a:t>Approach 2 - Transforming</a:t>
+            </a:r>
+            <a:endParaRPr lang="en-US" sz="2400" dirty="0"/>
+          </a:p>
+        </p:txBody>
+      </p:sp>
+      <p:sp>
+        <p:nvSpPr>
+          <p:cNvPr id="3" name="Content Placeholder 2">
+            <a:extLst>
+              <a:ext uri="{FF2B5EF4-FFF2-40B4-BE49-F238E27FC236}">
+                <a16:creationId xmlns:a16="http://schemas.microsoft.com/office/drawing/2014/main" id="{24420B42-4123-42C4-A3EE-B8CED6810E04}"/>
+              </a:ext>
+            </a:extLst>
+          </p:cNvPr>
+          <p:cNvSpPr>
+            <a:spLocks noGrp="1"/>
+          </p:cNvSpPr>
+          <p:nvPr>
+            <p:ph idx="1"/>
+          </p:nvPr>
+        </p:nvSpPr>
+        <p:spPr>
+          <a:xfrm>
+            <a:off x="1577075" y="1249920"/>
+            <a:ext cx="10018713" cy="4358159"/>
+          </a:xfrm>
+        </p:spPr>
+        <p:txBody>
+          <a:bodyPr>
+            <a:normAutofit/>
+          </a:bodyPr>
+          <a:lstStyle/>
+          <a:p>
+            <a:r>
+              <a:rPr lang="en-US" dirty="0"/>
+              <a:t>INFO ON EXTRACTING</a:t>
+            </a:r>
+          </a:p>
+        </p:txBody>
+      </p:sp>
+    </p:spTree>
+    <p:extLst>
+      <p:ext uri="{BB962C8B-B14F-4D97-AF65-F5344CB8AC3E}">
+        <p14:creationId xmlns:p14="http://schemas.microsoft.com/office/powerpoint/2010/main" val="844787271"/>
+      </p:ext>
+    </p:extLst>
+  </p:cSld>
+  <p:clrMapOvr>
+    <a:masterClrMapping/>
+  </p:clrMapOvr>
+</p:sld>
+</file>
+
+<file path=ppt/slides/slide13.xml><?xml version="1.0" encoding="utf-8"?>
+<p:sld xmlns:a="http://schemas.openxmlformats.org/drawingml/2006/main" xmlns:r="http://schemas.openxmlformats.org/officeDocument/2006/relationships" xmlns:p="http://schemas.openxmlformats.org/presentationml/2006/main">
+  <p:cSld>
+    <p:spTree>
+      <p:nvGrpSpPr>
+        <p:cNvPr id="1" name=""/>
+        <p:cNvGrpSpPr/>
+        <p:nvPr/>
+      </p:nvGrpSpPr>
+      <p:grpSpPr>
+        <a:xfrm>
+          <a:off x="0" y="0"/>
+          <a:ext cx="0" cy="0"/>
+          <a:chOff x="0" y="0"/>
+          <a:chExt cx="0" cy="0"/>
+        </a:xfrm>
+      </p:grpSpPr>
+      <p:sp>
+        <p:nvSpPr>
+          <p:cNvPr id="2" name="Title 1">
+            <a:extLst>
+              <a:ext uri="{FF2B5EF4-FFF2-40B4-BE49-F238E27FC236}">
+                <a16:creationId xmlns:a16="http://schemas.microsoft.com/office/drawing/2014/main" id="{DF2314C0-5399-49F6-8AD6-87EDDFF32150}"/>
+              </a:ext>
+            </a:extLst>
+          </p:cNvPr>
+          <p:cNvSpPr>
+            <a:spLocks noGrp="1"/>
+          </p:cNvSpPr>
+          <p:nvPr>
+            <p:ph type="title"/>
+          </p:nvPr>
+        </p:nvSpPr>
+        <p:spPr>
+          <a:xfrm>
+            <a:off x="1577075" y="162340"/>
+            <a:ext cx="10018713" cy="559904"/>
+          </a:xfrm>
+        </p:spPr>
+        <p:txBody>
+          <a:bodyPr>
+            <a:normAutofit/>
+          </a:bodyPr>
+          <a:lstStyle/>
+          <a:p>
+            <a:pPr algn="l"/>
+            <a:r>
+              <a:rPr lang="en-US" sz="2400" dirty="0">
+                <a:latin typeface="Calibri" panose="020F0502020204030204" pitchFamily="34" charset="0"/>
+              </a:rPr>
+              <a:t>Approach 2 - Loading</a:t>
+            </a:r>
+            <a:endParaRPr lang="en-US" sz="2400" dirty="0"/>
+          </a:p>
+        </p:txBody>
+      </p:sp>
+      <p:sp>
+        <p:nvSpPr>
+          <p:cNvPr id="3" name="Content Placeholder 2">
+            <a:extLst>
+              <a:ext uri="{FF2B5EF4-FFF2-40B4-BE49-F238E27FC236}">
+                <a16:creationId xmlns:a16="http://schemas.microsoft.com/office/drawing/2014/main" id="{24420B42-4123-42C4-A3EE-B8CED6810E04}"/>
+              </a:ext>
+            </a:extLst>
+          </p:cNvPr>
+          <p:cNvSpPr>
+            <a:spLocks noGrp="1"/>
+          </p:cNvSpPr>
+          <p:nvPr>
+            <p:ph idx="1"/>
+          </p:nvPr>
+        </p:nvSpPr>
+        <p:spPr>
+          <a:xfrm>
+            <a:off x="1577075" y="1249920"/>
+            <a:ext cx="10018713" cy="4358159"/>
+          </a:xfrm>
+        </p:spPr>
+        <p:txBody>
+          <a:bodyPr>
+            <a:normAutofit/>
+          </a:bodyPr>
+          <a:lstStyle/>
+          <a:p>
+            <a:r>
+              <a:rPr lang="en-US" dirty="0"/>
+              <a:t>INFO ON EXTRACTING</a:t>
+            </a:r>
+          </a:p>
+        </p:txBody>
+      </p:sp>
+    </p:spTree>
+    <p:extLst>
+      <p:ext uri="{BB962C8B-B14F-4D97-AF65-F5344CB8AC3E}">
+        <p14:creationId xmlns:p14="http://schemas.microsoft.com/office/powerpoint/2010/main" val="3814676399"/>
+      </p:ext>
+    </p:extLst>
+  </p:cSld>
+  <p:clrMapOvr>
+    <a:masterClrMapping/>
+  </p:clrMapOvr>
+</p:sld>
+</file>
+
+<file path=ppt/slides/slide14.xml><?xml version="1.0" encoding="utf-8"?>
+<p:sld xmlns:a="http://schemas.openxmlformats.org/drawingml/2006/main" xmlns:r="http://schemas.openxmlformats.org/officeDocument/2006/relationships" xmlns:p="http://schemas.openxmlformats.org/presentationml/2006/main">
+  <p:cSld>
+    <p:spTree>
+      <p:nvGrpSpPr>
+        <p:cNvPr id="1" name=""/>
+        <p:cNvGrpSpPr/>
+        <p:nvPr/>
+      </p:nvGrpSpPr>
+      <p:grpSpPr>
+        <a:xfrm>
+          <a:off x="0" y="0"/>
+          <a:ext cx="0" cy="0"/>
+          <a:chOff x="0" y="0"/>
+          <a:chExt cx="0" cy="0"/>
+        </a:xfrm>
+      </p:grpSpPr>
+      <p:sp>
+        <p:nvSpPr>
+          <p:cNvPr id="2" name="Title 1">
+            <a:extLst>
+              <a:ext uri="{FF2B5EF4-FFF2-40B4-BE49-F238E27FC236}">
+                <a16:creationId xmlns:a16="http://schemas.microsoft.com/office/drawing/2014/main" id="{1CD77767-1B4D-41A7-973F-7135FBE63F75}"/>
+              </a:ext>
+            </a:extLst>
+          </p:cNvPr>
+          <p:cNvSpPr>
+            <a:spLocks noGrp="1"/>
+          </p:cNvSpPr>
+          <p:nvPr>
+            <p:ph type="title"/>
+          </p:nvPr>
+        </p:nvSpPr>
+        <p:spPr>
+          <a:xfrm>
+            <a:off x="1630624" y="373023"/>
+            <a:ext cx="8930747" cy="936488"/>
+          </a:xfrm>
+        </p:spPr>
+        <p:txBody>
+          <a:bodyPr anchor="t">
+            <a:noAutofit/>
+          </a:bodyPr>
+          <a:lstStyle/>
+          <a:p>
+            <a:pPr algn="l"/>
+            <a:r>
+              <a:rPr lang="en-US" sz="2800" dirty="0">
+                <a:latin typeface="Calibri" panose="020F0502020204030204" pitchFamily="34" charset="0"/>
+              </a:rPr>
+              <a:t>Approach 3</a:t>
+            </a:r>
+            <a:endParaRPr lang="en-US" sz="2800" dirty="0"/>
+          </a:p>
+        </p:txBody>
+      </p:sp>
+      <p:sp>
+        <p:nvSpPr>
+          <p:cNvPr id="3" name="Text Placeholder 2">
+            <a:extLst>
+              <a:ext uri="{FF2B5EF4-FFF2-40B4-BE49-F238E27FC236}">
+                <a16:creationId xmlns:a16="http://schemas.microsoft.com/office/drawing/2014/main" id="{23F62359-DE82-4A1D-9D06-C5B2423B7694}"/>
+              </a:ext>
+            </a:extLst>
+          </p:cNvPr>
+          <p:cNvSpPr>
+            <a:spLocks noGrp="1"/>
+          </p:cNvSpPr>
+          <p:nvPr>
+            <p:ph type="body" idx="1"/>
+          </p:nvPr>
+        </p:nvSpPr>
+        <p:spPr>
+          <a:xfrm>
+            <a:off x="1630624" y="2348089"/>
+            <a:ext cx="8930747" cy="3200400"/>
+          </a:xfrm>
+        </p:spPr>
+        <p:txBody>
+          <a:bodyPr anchor="ctr"/>
+          <a:lstStyle/>
+          <a:p>
+            <a:pPr marL="342900" indent="-342900" algn="l">
+              <a:buFont typeface="Arial" panose="020B0604020202020204" pitchFamily="34" charset="0"/>
+              <a:buChar char="•"/>
+            </a:pPr>
+            <a:r>
+              <a:rPr lang="en-US" dirty="0"/>
+              <a:t>CONTENT HERE</a:t>
+            </a:r>
+          </a:p>
+        </p:txBody>
+      </p:sp>
+    </p:spTree>
+    <p:extLst>
+      <p:ext uri="{BB962C8B-B14F-4D97-AF65-F5344CB8AC3E}">
+        <p14:creationId xmlns:p14="http://schemas.microsoft.com/office/powerpoint/2010/main" val="3204984208"/>
+      </p:ext>
+    </p:extLst>
+  </p:cSld>
+  <p:clrMapOvr>
+    <a:masterClrMapping/>
+  </p:clrMapOvr>
+</p:sld>
+</file>
+
+<file path=ppt/slides/slide15.xml><?xml version="1.0" encoding="utf-8"?>
+<p:sld xmlns:a="http://schemas.openxmlformats.org/drawingml/2006/main" xmlns:r="http://schemas.openxmlformats.org/officeDocument/2006/relationships" xmlns:p="http://schemas.openxmlformats.org/presentationml/2006/main">
+  <p:cSld>
+    <p:spTree>
+      <p:nvGrpSpPr>
+        <p:cNvPr id="1" name=""/>
+        <p:cNvGrpSpPr/>
+        <p:nvPr/>
+      </p:nvGrpSpPr>
+      <p:grpSpPr>
+        <a:xfrm>
+          <a:off x="0" y="0"/>
+          <a:ext cx="0" cy="0"/>
+          <a:chOff x="0" y="0"/>
+          <a:chExt cx="0" cy="0"/>
+        </a:xfrm>
+      </p:grpSpPr>
+      <p:sp>
+        <p:nvSpPr>
+          <p:cNvPr id="2" name="Title 1">
+            <a:extLst>
+              <a:ext uri="{FF2B5EF4-FFF2-40B4-BE49-F238E27FC236}">
+                <a16:creationId xmlns:a16="http://schemas.microsoft.com/office/drawing/2014/main" id="{DF2314C0-5399-49F6-8AD6-87EDDFF32150}"/>
+              </a:ext>
+            </a:extLst>
+          </p:cNvPr>
+          <p:cNvSpPr>
+            <a:spLocks noGrp="1"/>
+          </p:cNvSpPr>
+          <p:nvPr>
+            <p:ph type="title"/>
+          </p:nvPr>
+        </p:nvSpPr>
+        <p:spPr>
+          <a:xfrm>
+            <a:off x="1577075" y="162340"/>
+            <a:ext cx="10018713" cy="559904"/>
+          </a:xfrm>
+        </p:spPr>
+        <p:txBody>
+          <a:bodyPr>
+            <a:normAutofit/>
+          </a:bodyPr>
+          <a:lstStyle/>
+          <a:p>
+            <a:pPr algn="l"/>
+            <a:r>
+              <a:rPr lang="en-US" sz="2400" dirty="0">
+                <a:latin typeface="Calibri" panose="020F0502020204030204" pitchFamily="34" charset="0"/>
+              </a:rPr>
+              <a:t>Approach 3 – Part 1: ETL</a:t>
+            </a:r>
+            <a:endParaRPr lang="en-US" sz="2400" dirty="0"/>
+          </a:p>
+        </p:txBody>
+      </p:sp>
+      <p:sp>
+        <p:nvSpPr>
+          <p:cNvPr id="3" name="Content Placeholder 2">
+            <a:extLst>
+              <a:ext uri="{FF2B5EF4-FFF2-40B4-BE49-F238E27FC236}">
+                <a16:creationId xmlns:a16="http://schemas.microsoft.com/office/drawing/2014/main" id="{24420B42-4123-42C4-A3EE-B8CED6810E04}"/>
+              </a:ext>
+            </a:extLst>
+          </p:cNvPr>
+          <p:cNvSpPr>
+            <a:spLocks noGrp="1"/>
+          </p:cNvSpPr>
+          <p:nvPr>
+            <p:ph idx="1"/>
+          </p:nvPr>
+        </p:nvSpPr>
+        <p:spPr>
+          <a:xfrm>
+            <a:off x="1577075" y="1249920"/>
+            <a:ext cx="10018713" cy="4358159"/>
+          </a:xfrm>
+        </p:spPr>
+        <p:txBody>
+          <a:bodyPr>
+            <a:normAutofit/>
+          </a:bodyPr>
+          <a:lstStyle/>
+          <a:p>
+            <a:r>
+              <a:rPr lang="en-US" dirty="0"/>
+              <a:t>INFO ON EXTRACTING</a:t>
+            </a:r>
+          </a:p>
+        </p:txBody>
+      </p:sp>
+    </p:spTree>
+    <p:extLst>
+      <p:ext uri="{BB962C8B-B14F-4D97-AF65-F5344CB8AC3E}">
+        <p14:creationId xmlns:p14="http://schemas.microsoft.com/office/powerpoint/2010/main" val="1991003054"/>
+      </p:ext>
+    </p:extLst>
+  </p:cSld>
+  <p:clrMapOvr>
+    <a:masterClrMapping/>
+  </p:clrMapOvr>
+</p:sld>
+</file>
+
+<file path=ppt/slides/slide16.xml><?xml version="1.0" encoding="utf-8"?>
+<p:sld xmlns:a="http://schemas.openxmlformats.org/drawingml/2006/main" xmlns:r="http://schemas.openxmlformats.org/officeDocument/2006/relationships" xmlns:p="http://schemas.openxmlformats.org/presentationml/2006/main">
+  <p:cSld>
+    <p:spTree>
+      <p:nvGrpSpPr>
+        <p:cNvPr id="1" name=""/>
+        <p:cNvGrpSpPr/>
+        <p:nvPr/>
+      </p:nvGrpSpPr>
+      <p:grpSpPr>
+        <a:xfrm>
+          <a:off x="0" y="0"/>
+          <a:ext cx="0" cy="0"/>
+          <a:chOff x="0" y="0"/>
+          <a:chExt cx="0" cy="0"/>
+        </a:xfrm>
+      </p:grpSpPr>
+      <p:sp>
+        <p:nvSpPr>
+          <p:cNvPr id="2" name="Title 1">
+            <a:extLst>
+              <a:ext uri="{FF2B5EF4-FFF2-40B4-BE49-F238E27FC236}">
+                <a16:creationId xmlns:a16="http://schemas.microsoft.com/office/drawing/2014/main" id="{DF2314C0-5399-49F6-8AD6-87EDDFF32150}"/>
+              </a:ext>
+            </a:extLst>
+          </p:cNvPr>
+          <p:cNvSpPr>
+            <a:spLocks noGrp="1"/>
+          </p:cNvSpPr>
+          <p:nvPr>
+            <p:ph type="title"/>
+          </p:nvPr>
+        </p:nvSpPr>
+        <p:spPr>
+          <a:xfrm>
+            <a:off x="1577075" y="162340"/>
+            <a:ext cx="10018713" cy="559904"/>
+          </a:xfrm>
+        </p:spPr>
+        <p:txBody>
+          <a:bodyPr>
+            <a:normAutofit/>
+          </a:bodyPr>
+          <a:lstStyle/>
+          <a:p>
+            <a:pPr algn="l"/>
+            <a:r>
+              <a:rPr lang="en-US" sz="2400" dirty="0">
+                <a:latin typeface="Calibri" panose="020F0502020204030204" pitchFamily="34" charset="0"/>
+              </a:rPr>
+              <a:t>Approach 3 – Part 2: Extract and </a:t>
+            </a:r>
+            <a:r>
+              <a:rPr lang="en-US" sz="2400" dirty="0" err="1">
+                <a:latin typeface="Calibri" panose="020F0502020204030204" pitchFamily="34" charset="0"/>
+              </a:rPr>
+              <a:t>Tranform</a:t>
+            </a:r>
+            <a:endParaRPr lang="en-US" sz="2400" dirty="0"/>
+          </a:p>
+        </p:txBody>
+      </p:sp>
+      <p:sp>
+        <p:nvSpPr>
+          <p:cNvPr id="3" name="Content Placeholder 2">
+            <a:extLst>
+              <a:ext uri="{FF2B5EF4-FFF2-40B4-BE49-F238E27FC236}">
+                <a16:creationId xmlns:a16="http://schemas.microsoft.com/office/drawing/2014/main" id="{24420B42-4123-42C4-A3EE-B8CED6810E04}"/>
+              </a:ext>
+            </a:extLst>
+          </p:cNvPr>
+          <p:cNvSpPr>
+            <a:spLocks noGrp="1"/>
+          </p:cNvSpPr>
+          <p:nvPr>
+            <p:ph idx="1"/>
+          </p:nvPr>
+        </p:nvSpPr>
+        <p:spPr>
+          <a:xfrm>
+            <a:off x="1577075" y="1249920"/>
+            <a:ext cx="10018713" cy="4358159"/>
+          </a:xfrm>
+        </p:spPr>
+        <p:txBody>
+          <a:bodyPr>
+            <a:normAutofit/>
+          </a:bodyPr>
+          <a:lstStyle/>
+          <a:p>
+            <a:r>
+              <a:rPr lang="en-US" dirty="0"/>
+              <a:t>INFO ON EXTRACTING</a:t>
+            </a:r>
+          </a:p>
+        </p:txBody>
+      </p:sp>
+    </p:spTree>
+    <p:extLst>
+      <p:ext uri="{BB962C8B-B14F-4D97-AF65-F5344CB8AC3E}">
+        <p14:creationId xmlns:p14="http://schemas.microsoft.com/office/powerpoint/2010/main" val="3549025876"/>
+      </p:ext>
+    </p:extLst>
+  </p:cSld>
+  <p:clrMapOvr>
+    <a:masterClrMapping/>
+  </p:clrMapOvr>
+</p:sld>
+</file>
+
+<file path=ppt/slides/slide17.xml><?xml version="1.0" encoding="utf-8"?>
+<p:sld xmlns:a="http://schemas.openxmlformats.org/drawingml/2006/main" xmlns:r="http://schemas.openxmlformats.org/officeDocument/2006/relationships" xmlns:p="http://schemas.openxmlformats.org/presentationml/2006/main">
+  <p:cSld>
+    <p:spTree>
+      <p:nvGrpSpPr>
+        <p:cNvPr id="1" name=""/>
+        <p:cNvGrpSpPr/>
+        <p:nvPr/>
+      </p:nvGrpSpPr>
+      <p:grpSpPr>
+        <a:xfrm>
+          <a:off x="0" y="0"/>
+          <a:ext cx="0" cy="0"/>
+          <a:chOff x="0" y="0"/>
+          <a:chExt cx="0" cy="0"/>
+        </a:xfrm>
+      </p:grpSpPr>
+      <p:sp>
+        <p:nvSpPr>
+          <p:cNvPr id="2" name="Title 1">
+            <a:extLst>
+              <a:ext uri="{FF2B5EF4-FFF2-40B4-BE49-F238E27FC236}">
+                <a16:creationId xmlns:a16="http://schemas.microsoft.com/office/drawing/2014/main" id="{DF2314C0-5399-49F6-8AD6-87EDDFF32150}"/>
+              </a:ext>
+            </a:extLst>
+          </p:cNvPr>
+          <p:cNvSpPr>
+            <a:spLocks noGrp="1"/>
+          </p:cNvSpPr>
+          <p:nvPr>
+            <p:ph type="title"/>
+          </p:nvPr>
+        </p:nvSpPr>
+        <p:spPr>
+          <a:xfrm>
+            <a:off x="1577075" y="162340"/>
+            <a:ext cx="10018713" cy="559904"/>
+          </a:xfrm>
+        </p:spPr>
+        <p:txBody>
+          <a:bodyPr>
+            <a:normAutofit/>
+          </a:bodyPr>
+          <a:lstStyle/>
+          <a:p>
+            <a:pPr algn="l"/>
+            <a:r>
+              <a:rPr lang="en-US" sz="2400" dirty="0">
+                <a:latin typeface="Calibri" panose="020F0502020204030204" pitchFamily="34" charset="0"/>
+              </a:rPr>
+              <a:t>Approach 3 – Part 2: Loading</a:t>
+            </a:r>
+            <a:endParaRPr lang="en-US" sz="2400" dirty="0"/>
+          </a:p>
+        </p:txBody>
+      </p:sp>
+      <p:sp>
+        <p:nvSpPr>
+          <p:cNvPr id="3" name="Content Placeholder 2">
+            <a:extLst>
+              <a:ext uri="{FF2B5EF4-FFF2-40B4-BE49-F238E27FC236}">
+                <a16:creationId xmlns:a16="http://schemas.microsoft.com/office/drawing/2014/main" id="{24420B42-4123-42C4-A3EE-B8CED6810E04}"/>
+              </a:ext>
+            </a:extLst>
+          </p:cNvPr>
+          <p:cNvSpPr>
+            <a:spLocks noGrp="1"/>
+          </p:cNvSpPr>
+          <p:nvPr>
+            <p:ph idx="1"/>
+          </p:nvPr>
+        </p:nvSpPr>
+        <p:spPr>
+          <a:xfrm>
+            <a:off x="1577075" y="1249920"/>
+            <a:ext cx="10018713" cy="4358159"/>
+          </a:xfrm>
+        </p:spPr>
+        <p:txBody>
+          <a:bodyPr>
+            <a:normAutofit/>
+          </a:bodyPr>
+          <a:lstStyle/>
+          <a:p>
+            <a:r>
+              <a:rPr lang="en-US" dirty="0"/>
+              <a:t>INFO ON EXTRACTING</a:t>
+            </a:r>
+          </a:p>
+        </p:txBody>
+      </p:sp>
+    </p:spTree>
+    <p:extLst>
+      <p:ext uri="{BB962C8B-B14F-4D97-AF65-F5344CB8AC3E}">
+        <p14:creationId xmlns:p14="http://schemas.microsoft.com/office/powerpoint/2010/main" val="1413811751"/>
+      </p:ext>
+    </p:extLst>
+  </p:cSld>
+  <p:clrMapOvr>
+    <a:masterClrMapping/>
+  </p:clrMapOvr>
+</p:sld>
+</file>
+
+<file path=ppt/slides/slide18.xml><?xml version="1.0" encoding="utf-8"?>
+<p:sld xmlns:a="http://schemas.openxmlformats.org/drawingml/2006/main" xmlns:r="http://schemas.openxmlformats.org/officeDocument/2006/relationships" xmlns:p="http://schemas.openxmlformats.org/presentationml/2006/main">
+  <p:cSld>
+    <p:spTree>
+      <p:nvGrpSpPr>
+        <p:cNvPr id="1" name=""/>
+        <p:cNvGrpSpPr/>
+        <p:nvPr/>
+      </p:nvGrpSpPr>
+      <p:grpSpPr>
+        <a:xfrm>
+          <a:off x="0" y="0"/>
+          <a:ext cx="0" cy="0"/>
+          <a:chOff x="0" y="0"/>
+          <a:chExt cx="0" cy="0"/>
+        </a:xfrm>
+      </p:grpSpPr>
+      <p:sp>
+        <p:nvSpPr>
+          <p:cNvPr id="2" name="Title 1">
+            <a:extLst>
+              <a:ext uri="{FF2B5EF4-FFF2-40B4-BE49-F238E27FC236}">
+                <a16:creationId xmlns:a16="http://schemas.microsoft.com/office/drawing/2014/main" id="{1CD77767-1B4D-41A7-973F-7135FBE63F75}"/>
+              </a:ext>
+            </a:extLst>
+          </p:cNvPr>
+          <p:cNvSpPr>
+            <a:spLocks noGrp="1"/>
+          </p:cNvSpPr>
+          <p:nvPr>
+            <p:ph type="title"/>
+          </p:nvPr>
+        </p:nvSpPr>
+        <p:spPr>
+          <a:xfrm>
+            <a:off x="1630624" y="373023"/>
+            <a:ext cx="8930747" cy="936488"/>
+          </a:xfrm>
+        </p:spPr>
+        <p:txBody>
+          <a:bodyPr anchor="t">
+            <a:noAutofit/>
+          </a:bodyPr>
+          <a:lstStyle/>
+          <a:p>
+            <a:pPr algn="l"/>
+            <a:r>
+              <a:rPr lang="en-US" sz="2800" dirty="0">
+                <a:latin typeface="Calibri" panose="020F0502020204030204" pitchFamily="34" charset="0"/>
+              </a:rPr>
+              <a:t>The Question</a:t>
+            </a:r>
+            <a:endParaRPr lang="en-US" sz="2800" dirty="0"/>
+          </a:p>
+        </p:txBody>
+      </p:sp>
+      <p:sp>
+        <p:nvSpPr>
+          <p:cNvPr id="3" name="Text Placeholder 2">
+            <a:extLst>
+              <a:ext uri="{FF2B5EF4-FFF2-40B4-BE49-F238E27FC236}">
+                <a16:creationId xmlns:a16="http://schemas.microsoft.com/office/drawing/2014/main" id="{23F62359-DE82-4A1D-9D06-C5B2423B7694}"/>
+              </a:ext>
+            </a:extLst>
+          </p:cNvPr>
+          <p:cNvSpPr>
+            <a:spLocks noGrp="1"/>
+          </p:cNvSpPr>
+          <p:nvPr>
+            <p:ph type="body" idx="1"/>
+          </p:nvPr>
+        </p:nvSpPr>
+        <p:spPr>
+          <a:xfrm>
+            <a:off x="1630624" y="2348089"/>
+            <a:ext cx="8930747" cy="3200400"/>
+          </a:xfrm>
+        </p:spPr>
+        <p:txBody>
+          <a:bodyPr anchor="ctr"/>
+          <a:lstStyle/>
+          <a:p>
+            <a:pPr marL="342900" indent="-342900" algn="l">
+              <a:buFont typeface="Arial" panose="020B0604020202020204" pitchFamily="34" charset="0"/>
+              <a:buChar char="•"/>
+            </a:pPr>
+            <a:r>
+              <a:rPr lang="en-US" dirty="0"/>
+              <a:t>CONTENT HERE</a:t>
+            </a:r>
+          </a:p>
+        </p:txBody>
+      </p:sp>
+    </p:spTree>
+    <p:extLst>
+      <p:ext uri="{BB962C8B-B14F-4D97-AF65-F5344CB8AC3E}">
+        <p14:creationId xmlns:p14="http://schemas.microsoft.com/office/powerpoint/2010/main" val="16188636"/>
+      </p:ext>
+    </p:extLst>
+  </p:cSld>
+  <p:clrMapOvr>
+    <a:masterClrMapping/>
+  </p:clrMapOvr>
+</p:sld>
+</file>
+
+<file path=ppt/slides/slide19.xml><?xml version="1.0" encoding="utf-8"?>
+<p:sld xmlns:a="http://schemas.openxmlformats.org/drawingml/2006/main" xmlns:r="http://schemas.openxmlformats.org/officeDocument/2006/relationships" xmlns:p="http://schemas.openxmlformats.org/presentationml/2006/main">
+  <p:cSld>
+    <p:spTree>
+      <p:nvGrpSpPr>
+        <p:cNvPr id="1" name=""/>
+        <p:cNvGrpSpPr/>
+        <p:nvPr/>
+      </p:nvGrpSpPr>
+      <p:grpSpPr>
+        <a:xfrm>
+          <a:off x="0" y="0"/>
+          <a:ext cx="0" cy="0"/>
+          <a:chOff x="0" y="0"/>
+          <a:chExt cx="0" cy="0"/>
+        </a:xfrm>
+      </p:grpSpPr>
+      <p:sp>
+        <p:nvSpPr>
+          <p:cNvPr id="2" name="Title 1">
+            <a:extLst>
+              <a:ext uri="{FF2B5EF4-FFF2-40B4-BE49-F238E27FC236}">
+                <a16:creationId xmlns:a16="http://schemas.microsoft.com/office/drawing/2014/main" id="{DF2314C0-5399-49F6-8AD6-87EDDFF32150}"/>
+              </a:ext>
+            </a:extLst>
+          </p:cNvPr>
+          <p:cNvSpPr>
+            <a:spLocks noGrp="1"/>
+          </p:cNvSpPr>
+          <p:nvPr>
+            <p:ph type="title"/>
+          </p:nvPr>
+        </p:nvSpPr>
+        <p:spPr>
+          <a:xfrm>
+            <a:off x="1577075" y="162340"/>
+            <a:ext cx="10018713" cy="559904"/>
+          </a:xfrm>
+        </p:spPr>
+        <p:txBody>
+          <a:bodyPr>
+            <a:normAutofit/>
+          </a:bodyPr>
+          <a:lstStyle/>
+          <a:p>
+            <a:pPr algn="l"/>
+            <a:r>
+              <a:rPr lang="en-US" sz="2400" dirty="0">
+                <a:latin typeface="Calibri" panose="020F0502020204030204" pitchFamily="34" charset="0"/>
+              </a:rPr>
+              <a:t>Results</a:t>
             </a:r>
             <a:endParaRPr lang="en-US" sz="2400" dirty="0"/>
           </a:p>
@@ -6996,7 +7750,184 @@
 </p:sld>
 </file>
 
-<file path=ppt/slides/slide13.xml><?xml version="1.0" encoding="utf-8"?>
+<file path=ppt/slides/slide2.xml><?xml version="1.0" encoding="utf-8"?>
+<p:sld xmlns:a="http://schemas.openxmlformats.org/drawingml/2006/main" xmlns:r="http://schemas.openxmlformats.org/officeDocument/2006/relationships" xmlns:p="http://schemas.openxmlformats.org/presentationml/2006/main">
+  <p:cSld>
+    <p:spTree>
+      <p:nvGrpSpPr>
+        <p:cNvPr id="1" name=""/>
+        <p:cNvGrpSpPr/>
+        <p:nvPr/>
+      </p:nvGrpSpPr>
+      <p:grpSpPr>
+        <a:xfrm>
+          <a:off x="0" y="0"/>
+          <a:ext cx="0" cy="0"/>
+          <a:chOff x="0" y="0"/>
+          <a:chExt cx="0" cy="0"/>
+        </a:xfrm>
+      </p:grpSpPr>
+      <p:sp>
+        <p:nvSpPr>
+          <p:cNvPr id="2" name="Title 1">
+            <a:extLst>
+              <a:ext uri="{FF2B5EF4-FFF2-40B4-BE49-F238E27FC236}">
+                <a16:creationId xmlns:a16="http://schemas.microsoft.com/office/drawing/2014/main" id="{1CD77767-1B4D-41A7-973F-7135FBE63F75}"/>
+              </a:ext>
+            </a:extLst>
+          </p:cNvPr>
+          <p:cNvSpPr>
+            <a:spLocks noGrp="1"/>
+          </p:cNvSpPr>
+          <p:nvPr>
+            <p:ph type="title"/>
+          </p:nvPr>
+        </p:nvSpPr>
+        <p:spPr>
+          <a:xfrm>
+            <a:off x="1630625" y="536712"/>
+            <a:ext cx="8930747" cy="622852"/>
+          </a:xfrm>
+        </p:spPr>
+        <p:txBody>
+          <a:bodyPr>
+            <a:normAutofit fontScale="90000"/>
+          </a:bodyPr>
+          <a:lstStyle/>
+          <a:p>
+            <a:pPr algn="l"/>
+            <a:r>
+              <a:rPr lang="en-US" dirty="0"/>
+              <a:t>Introduction</a:t>
+            </a:r>
+          </a:p>
+        </p:txBody>
+      </p:sp>
+      <p:sp>
+        <p:nvSpPr>
+          <p:cNvPr id="3" name="Text Placeholder 2">
+            <a:extLst>
+              <a:ext uri="{FF2B5EF4-FFF2-40B4-BE49-F238E27FC236}">
+                <a16:creationId xmlns:a16="http://schemas.microsoft.com/office/drawing/2014/main" id="{23F62359-DE82-4A1D-9D06-C5B2423B7694}"/>
+              </a:ext>
+            </a:extLst>
+          </p:cNvPr>
+          <p:cNvSpPr>
+            <a:spLocks noGrp="1"/>
+          </p:cNvSpPr>
+          <p:nvPr>
+            <p:ph type="body" idx="1"/>
+          </p:nvPr>
+        </p:nvSpPr>
+        <p:spPr>
+          <a:xfrm>
+            <a:off x="1630625" y="2080426"/>
+            <a:ext cx="3834994" cy="2697147"/>
+          </a:xfrm>
+        </p:spPr>
+        <p:txBody>
+          <a:bodyPr anchor="ctr"/>
+          <a:lstStyle/>
+          <a:p>
+            <a:pPr algn="l"/>
+            <a:r>
+              <a:rPr lang="en-US" b="1" u="sng" dirty="0"/>
+              <a:t>-explanation of situation</a:t>
+            </a:r>
+          </a:p>
+          <a:p>
+            <a:pPr algn="l"/>
+            <a:endParaRPr lang="en-US" b="1" u="sng" dirty="0"/>
+          </a:p>
+          <a:p>
+            <a:pPr algn="l"/>
+            <a:r>
+              <a:rPr lang="en-US" b="1" u="sng" dirty="0"/>
+              <a:t>-explain hype</a:t>
+            </a:r>
+          </a:p>
+        </p:txBody>
+      </p:sp>
+    </p:spTree>
+    <p:extLst>
+      <p:ext uri="{BB962C8B-B14F-4D97-AF65-F5344CB8AC3E}">
+        <p14:creationId xmlns:p14="http://schemas.microsoft.com/office/powerpoint/2010/main" val="2711383471"/>
+      </p:ext>
+    </p:extLst>
+  </p:cSld>
+  <p:clrMapOvr>
+    <a:masterClrMapping/>
+  </p:clrMapOvr>
+</p:sld>
+</file>
+
+<file path=ppt/slides/slide20.xml><?xml version="1.0" encoding="utf-8"?>
+<p:sld xmlns:a="http://schemas.openxmlformats.org/drawingml/2006/main" xmlns:r="http://schemas.openxmlformats.org/officeDocument/2006/relationships" xmlns:p="http://schemas.openxmlformats.org/presentationml/2006/main">
+  <p:cSld>
+    <p:spTree>
+      <p:nvGrpSpPr>
+        <p:cNvPr id="1" name=""/>
+        <p:cNvGrpSpPr/>
+        <p:nvPr/>
+      </p:nvGrpSpPr>
+      <p:grpSpPr>
+        <a:xfrm>
+          <a:off x="0" y="0"/>
+          <a:ext cx="0" cy="0"/>
+          <a:chOff x="0" y="0"/>
+          <a:chExt cx="0" cy="0"/>
+        </a:xfrm>
+      </p:grpSpPr>
+      <p:sp>
+        <p:nvSpPr>
+          <p:cNvPr id="3" name="Text Placeholder 2">
+            <a:extLst>
+              <a:ext uri="{FF2B5EF4-FFF2-40B4-BE49-F238E27FC236}">
+                <a16:creationId xmlns:a16="http://schemas.microsoft.com/office/drawing/2014/main" id="{23F62359-DE82-4A1D-9D06-C5B2423B7694}"/>
+              </a:ext>
+            </a:extLst>
+          </p:cNvPr>
+          <p:cNvSpPr>
+            <a:spLocks noGrp="1"/>
+          </p:cNvSpPr>
+          <p:nvPr>
+            <p:ph type="body" idx="1"/>
+          </p:nvPr>
+        </p:nvSpPr>
+        <p:spPr>
+          <a:xfrm>
+            <a:off x="945571" y="2080426"/>
+            <a:ext cx="10300854" cy="2697147"/>
+          </a:xfrm>
+        </p:spPr>
+        <p:txBody>
+          <a:bodyPr anchor="ctr">
+            <a:normAutofit/>
+          </a:bodyPr>
+          <a:lstStyle/>
+          <a:p>
+            <a:pPr algn="ctr"/>
+            <a:r>
+              <a:rPr lang="en-US" sz="4000" dirty="0"/>
+              <a:t>OBNOXIOUS HYPE SLIDE</a:t>
+            </a:r>
+          </a:p>
+        </p:txBody>
+      </p:sp>
+    </p:spTree>
+    <p:extLst>
+      <p:ext uri="{BB962C8B-B14F-4D97-AF65-F5344CB8AC3E}">
+        <p14:creationId xmlns:p14="http://schemas.microsoft.com/office/powerpoint/2010/main" val="2254840963"/>
+      </p:ext>
+    </p:extLst>
+  </p:cSld>
+  <p:clrMapOvr>
+    <a:masterClrMapping/>
+  </p:clrMapOvr>
+</p:sld>
+</file>
+
+<file path=ppt/slides/slide21.xml><?xml version="1.0" encoding="utf-8"?>
 <p:sld xmlns:a="http://schemas.openxmlformats.org/drawingml/2006/main" xmlns:r="http://schemas.openxmlformats.org/officeDocument/2006/relationships" xmlns:p="http://schemas.openxmlformats.org/presentationml/2006/main">
   <p:cSld>
     <p:spTree>
@@ -7318,7 +8249,7 @@
 </p:sld>
 </file>
 
-<file path=ppt/slides/slide14.xml><?xml version="1.0" encoding="utf-8"?>
+<file path=ppt/slides/slide22.xml><?xml version="1.0" encoding="utf-8"?>
 <p:sld xmlns:a="http://schemas.openxmlformats.org/drawingml/2006/main" xmlns:r="http://schemas.openxmlformats.org/officeDocument/2006/relationships" xmlns:p="http://schemas.openxmlformats.org/presentationml/2006/main">
   <p:cSld>
     <p:spTree>
@@ -7353,8 +8284,8 @@
         </p:nvSpPr>
         <p:spPr>
           <a:xfrm>
-            <a:off x="1938215" y="1338958"/>
-            <a:ext cx="8315569" cy="4180084"/>
+            <a:off x="1938215" y="2660650"/>
+            <a:ext cx="8315569" cy="2864742"/>
           </a:xfrm>
         </p:spPr>
         <p:txBody>
@@ -7386,7 +8317,7 @@
 </p:sld>
 </file>
 
-<file path=ppt/slides/slide15.xml><?xml version="1.0" encoding="utf-8"?>
+<file path=ppt/slides/slide23.xml><?xml version="1.0" encoding="utf-8"?>
 <p:sld xmlns:a="http://schemas.openxmlformats.org/drawingml/2006/main" xmlns:r="http://schemas.openxmlformats.org/officeDocument/2006/relationships" xmlns:p="http://schemas.openxmlformats.org/presentationml/2006/main">
   <p:cSld>
     <p:spTree>
@@ -7489,7 +8420,7 @@
 </p:sld>
 </file>
 
-<file path=ppt/slides/slide16.xml><?xml version="1.0" encoding="utf-8"?>
+<file path=ppt/slides/slide24.xml><?xml version="1.0" encoding="utf-8"?>
 <p:sld xmlns:a="http://schemas.openxmlformats.org/drawingml/2006/main" xmlns:r="http://schemas.openxmlformats.org/officeDocument/2006/relationships" xmlns:p="http://schemas.openxmlformats.org/presentationml/2006/main">
   <p:cSld>
     <p:spTree>
@@ -7579,117 +8510,6 @@
     <p:extLst>
       <p:ext uri="{BB962C8B-B14F-4D97-AF65-F5344CB8AC3E}">
         <p14:creationId xmlns:p14="http://schemas.microsoft.com/office/powerpoint/2010/main" val="2050461892"/>
-      </p:ext>
-    </p:extLst>
-  </p:cSld>
-  <p:clrMapOvr>
-    <a:masterClrMapping/>
-  </p:clrMapOvr>
-</p:sld>
-</file>
-
-<file path=ppt/slides/slide2.xml><?xml version="1.0" encoding="utf-8"?>
-<p:sld xmlns:a="http://schemas.openxmlformats.org/drawingml/2006/main" xmlns:r="http://schemas.openxmlformats.org/officeDocument/2006/relationships" xmlns:p="http://schemas.openxmlformats.org/presentationml/2006/main">
-  <p:cSld>
-    <p:spTree>
-      <p:nvGrpSpPr>
-        <p:cNvPr id="1" name=""/>
-        <p:cNvGrpSpPr/>
-        <p:nvPr/>
-      </p:nvGrpSpPr>
-      <p:grpSpPr>
-        <a:xfrm>
-          <a:off x="0" y="0"/>
-          <a:ext cx="0" cy="0"/>
-          <a:chOff x="0" y="0"/>
-          <a:chExt cx="0" cy="0"/>
-        </a:xfrm>
-      </p:grpSpPr>
-      <p:sp>
-        <p:nvSpPr>
-          <p:cNvPr id="2" name="Title 1">
-            <a:extLst>
-              <a:ext uri="{FF2B5EF4-FFF2-40B4-BE49-F238E27FC236}">
-                <a16:creationId xmlns:a16="http://schemas.microsoft.com/office/drawing/2014/main" id="{1CD77767-1B4D-41A7-973F-7135FBE63F75}"/>
-              </a:ext>
-            </a:extLst>
-          </p:cNvPr>
-          <p:cNvSpPr>
-            <a:spLocks noGrp="1"/>
-          </p:cNvSpPr>
-          <p:nvPr>
-            <p:ph type="title"/>
-          </p:nvPr>
-        </p:nvSpPr>
-        <p:spPr>
-          <a:xfrm>
-            <a:off x="1630625" y="536712"/>
-            <a:ext cx="8930747" cy="622852"/>
-          </a:xfrm>
-        </p:spPr>
-        <p:txBody>
-          <a:bodyPr>
-            <a:normAutofit fontScale="90000"/>
-          </a:bodyPr>
-          <a:lstStyle/>
-          <a:p>
-            <a:pPr algn="l"/>
-            <a:r>
-              <a:rPr lang="en-US" dirty="0"/>
-              <a:t>Introduction</a:t>
-            </a:r>
-          </a:p>
-        </p:txBody>
-      </p:sp>
-      <p:sp>
-        <p:nvSpPr>
-          <p:cNvPr id="3" name="Text Placeholder 2">
-            <a:extLst>
-              <a:ext uri="{FF2B5EF4-FFF2-40B4-BE49-F238E27FC236}">
-                <a16:creationId xmlns:a16="http://schemas.microsoft.com/office/drawing/2014/main" id="{23F62359-DE82-4A1D-9D06-C5B2423B7694}"/>
-              </a:ext>
-            </a:extLst>
-          </p:cNvPr>
-          <p:cNvSpPr>
-            <a:spLocks noGrp="1"/>
-          </p:cNvSpPr>
-          <p:nvPr>
-            <p:ph type="body" idx="1"/>
-          </p:nvPr>
-        </p:nvSpPr>
-        <p:spPr>
-          <a:xfrm>
-            <a:off x="1630625" y="2080426"/>
-            <a:ext cx="3834994" cy="2697147"/>
-          </a:xfrm>
-        </p:spPr>
-        <p:txBody>
-          <a:bodyPr anchor="ctr"/>
-          <a:lstStyle/>
-          <a:p>
-            <a:pPr algn="l"/>
-            <a:r>
-              <a:rPr lang="en-US" b="1" u="sng" dirty="0"/>
-              <a:t>-explanation of situation</a:t>
-            </a:r>
-          </a:p>
-          <a:p>
-            <a:pPr algn="l"/>
-            <a:endParaRPr lang="en-US" b="1" u="sng" dirty="0"/>
-          </a:p>
-          <a:p>
-            <a:pPr algn="l"/>
-            <a:r>
-              <a:rPr lang="en-US" b="1" u="sng" dirty="0"/>
-              <a:t>-explain hype</a:t>
-            </a:r>
-          </a:p>
-        </p:txBody>
-      </p:sp>
-    </p:spTree>
-    <p:extLst>
-      <p:ext uri="{BB962C8B-B14F-4D97-AF65-F5344CB8AC3E}">
-        <p14:creationId xmlns:p14="http://schemas.microsoft.com/office/powerpoint/2010/main" val="2711383471"/>
       </p:ext>
     </p:extLst>
   </p:cSld>
@@ -7978,7 +8798,7 @@
               <a:rPr lang="en-US" sz="2800" dirty="0">
                 <a:latin typeface="Calibri" panose="020F0502020204030204" pitchFamily="34" charset="0"/>
               </a:rPr>
-              <a:t>Extracting</a:t>
+              <a:t>Different Approaches</a:t>
             </a:r>
             <a:endParaRPr lang="en-US" sz="2800" dirty="0"/>
           </a:p>
@@ -8002,12 +8822,14 @@
         </p:nvSpPr>
         <p:spPr>
           <a:xfrm>
-            <a:off x="1630624" y="2348089"/>
-            <a:ext cx="8930747" cy="3200400"/>
+            <a:off x="571500" y="1041400"/>
+            <a:ext cx="9989871" cy="4507089"/>
           </a:xfrm>
         </p:spPr>
         <p:txBody>
-          <a:bodyPr anchor="ctr"/>
+          <a:bodyPr anchor="ctr">
+            <a:normAutofit fontScale="85000" lnSpcReduction="20000"/>
+          </a:bodyPr>
           <a:lstStyle/>
           <a:p>
             <a:pPr marL="342900" indent="-342900" algn="l">
@@ -8016,7 +8838,125 @@
             </a:pPr>
             <a:r>
               <a:rPr lang="en-US" dirty="0"/>
-              <a:t>CONTENT HERE</a:t>
+              <a:t>Approach 1</a:t>
+            </a:r>
+          </a:p>
+          <a:p>
+            <a:pPr marL="800100" lvl="1" indent="-342900">
+              <a:buFont typeface="Arial" panose="020B0604020202020204" pitchFamily="34" charset="0"/>
+              <a:buChar char="•"/>
+            </a:pPr>
+            <a:r>
+              <a:rPr lang="en-US" dirty="0"/>
+              <a:t>Text</a:t>
+            </a:r>
+          </a:p>
+          <a:p>
+            <a:pPr marL="800100" lvl="1" indent="-342900">
+              <a:buFont typeface="Arial" panose="020B0604020202020204" pitchFamily="34" charset="0"/>
+              <a:buChar char="•"/>
+            </a:pPr>
+            <a:r>
+              <a:rPr lang="en-US" dirty="0"/>
+              <a:t>Text</a:t>
+            </a:r>
+          </a:p>
+          <a:p>
+            <a:pPr marL="800100" lvl="1" indent="-342900">
+              <a:buFont typeface="Arial" panose="020B0604020202020204" pitchFamily="34" charset="0"/>
+              <a:buChar char="•"/>
+            </a:pPr>
+            <a:r>
+              <a:rPr lang="en-US" dirty="0"/>
+              <a:t>Text</a:t>
+            </a:r>
+          </a:p>
+          <a:p>
+            <a:pPr lvl="1"/>
+            <a:endParaRPr lang="en-US" dirty="0"/>
+          </a:p>
+          <a:p>
+            <a:pPr marL="342900" indent="-342900">
+              <a:buFont typeface="Arial" panose="020B0604020202020204" pitchFamily="34" charset="0"/>
+              <a:buChar char="•"/>
+            </a:pPr>
+            <a:r>
+              <a:rPr lang="en-US" dirty="0"/>
+              <a:t>Approach 2</a:t>
+            </a:r>
+          </a:p>
+          <a:p>
+            <a:pPr marL="800100" lvl="1" indent="-342900">
+              <a:buFont typeface="Arial" panose="020B0604020202020204" pitchFamily="34" charset="0"/>
+              <a:buChar char="•"/>
+            </a:pPr>
+            <a:r>
+              <a:rPr lang="en-US" dirty="0"/>
+              <a:t>Text</a:t>
+            </a:r>
+          </a:p>
+          <a:p>
+            <a:pPr marL="800100" lvl="1" indent="-342900">
+              <a:buFont typeface="Arial" panose="020B0604020202020204" pitchFamily="34" charset="0"/>
+              <a:buChar char="•"/>
+            </a:pPr>
+            <a:r>
+              <a:rPr lang="en-US" dirty="0"/>
+              <a:t>Text</a:t>
+            </a:r>
+          </a:p>
+          <a:p>
+            <a:pPr marL="800100" lvl="1" indent="-342900">
+              <a:buFont typeface="Arial" panose="020B0604020202020204" pitchFamily="34" charset="0"/>
+              <a:buChar char="•"/>
+            </a:pPr>
+            <a:r>
+              <a:rPr lang="en-US" dirty="0"/>
+              <a:t>Text</a:t>
+            </a:r>
+          </a:p>
+          <a:p>
+            <a:pPr lvl="1"/>
+            <a:endParaRPr lang="en-US" dirty="0"/>
+          </a:p>
+          <a:p>
+            <a:pPr marL="342900" indent="-342900">
+              <a:buFont typeface="Arial" panose="020B0604020202020204" pitchFamily="34" charset="0"/>
+              <a:buChar char="•"/>
+            </a:pPr>
+            <a:r>
+              <a:rPr lang="en-US" dirty="0"/>
+              <a:t>Approach 3</a:t>
+            </a:r>
+          </a:p>
+          <a:p>
+            <a:pPr marL="800100" lvl="1" indent="-342900">
+              <a:buFont typeface="Arial" panose="020B0604020202020204" pitchFamily="34" charset="0"/>
+              <a:buChar char="•"/>
+            </a:pPr>
+            <a:r>
+              <a:rPr lang="en-US" dirty="0"/>
+              <a:t>Text</a:t>
+            </a:r>
+          </a:p>
+          <a:p>
+            <a:pPr marL="800100" lvl="1" indent="-342900">
+              <a:buFont typeface="Arial" panose="020B0604020202020204" pitchFamily="34" charset="0"/>
+              <a:buChar char="•"/>
+            </a:pPr>
+            <a:r>
+              <a:rPr lang="en-US" dirty="0"/>
+              <a:t>Text</a:t>
+            </a:r>
+          </a:p>
+          <a:p>
+            <a:pPr marL="800100" lvl="1" indent="-342900">
+              <a:buFont typeface="Arial" panose="020B0604020202020204" pitchFamily="34" charset="0"/>
+              <a:buChar char="•"/>
+            </a:pPr>
+            <a:r>
+              <a:rPr lang="en-US" dirty="0"/>
+              <a:t>Text</a:t>
             </a:r>
           </a:p>
         </p:txBody>
@@ -8056,7 +8996,7 @@
           <p:cNvPr id="2" name="Title 1">
             <a:extLst>
               <a:ext uri="{FF2B5EF4-FFF2-40B4-BE49-F238E27FC236}">
-                <a16:creationId xmlns:a16="http://schemas.microsoft.com/office/drawing/2014/main" id="{DF2314C0-5399-49F6-8AD6-87EDDFF32150}"/>
+                <a16:creationId xmlns:a16="http://schemas.microsoft.com/office/drawing/2014/main" id="{1CD77767-1B4D-41A7-973F-7135FBE63F75}"/>
               </a:ext>
             </a:extLst>
           </p:cNvPr>
@@ -8069,33 +9009,33 @@
         </p:nvSpPr>
         <p:spPr>
           <a:xfrm>
-            <a:off x="1577075" y="162340"/>
-            <a:ext cx="10018713" cy="559904"/>
+            <a:off x="1630624" y="373023"/>
+            <a:ext cx="8930747" cy="936488"/>
           </a:xfrm>
         </p:spPr>
         <p:txBody>
-          <a:bodyPr>
-            <a:normAutofit/>
+          <a:bodyPr anchor="t">
+            <a:noAutofit/>
           </a:bodyPr>
           <a:lstStyle/>
           <a:p>
             <a:pPr algn="l"/>
             <a:r>
-              <a:rPr lang="en-US" sz="2400" dirty="0">
+              <a:rPr lang="en-US" sz="2800" dirty="0">
                 <a:latin typeface="Calibri" panose="020F0502020204030204" pitchFamily="34" charset="0"/>
               </a:rPr>
-              <a:t>Extracting</a:t>
-            </a:r>
-            <a:endParaRPr lang="en-US" sz="2400" dirty="0"/>
-          </a:p>
-        </p:txBody>
-      </p:sp>
-      <p:sp>
-        <p:nvSpPr>
-          <p:cNvPr id="3" name="Content Placeholder 2">
+              <a:t>Approach 1</a:t>
+            </a:r>
+            <a:endParaRPr lang="en-US" sz="2800" dirty="0"/>
+          </a:p>
+        </p:txBody>
+      </p:sp>
+      <p:sp>
+        <p:nvSpPr>
+          <p:cNvPr id="3" name="Text Placeholder 2">
             <a:extLst>
               <a:ext uri="{FF2B5EF4-FFF2-40B4-BE49-F238E27FC236}">
-                <a16:creationId xmlns:a16="http://schemas.microsoft.com/office/drawing/2014/main" id="{24420B42-4123-42C4-A3EE-B8CED6810E04}"/>
+                <a16:creationId xmlns:a16="http://schemas.microsoft.com/office/drawing/2014/main" id="{23F62359-DE82-4A1D-9D06-C5B2423B7694}"/>
               </a:ext>
             </a:extLst>
           </p:cNvPr>
@@ -8103,24 +9043,26 @@
             <a:spLocks noGrp="1"/>
           </p:cNvSpPr>
           <p:nvPr>
-            <p:ph idx="1"/>
+            <p:ph type="body" idx="1"/>
           </p:nvPr>
         </p:nvSpPr>
         <p:spPr>
           <a:xfrm>
-            <a:off x="1577075" y="1249920"/>
-            <a:ext cx="10018713" cy="4358159"/>
+            <a:off x="1630624" y="2348089"/>
+            <a:ext cx="8930747" cy="3200400"/>
           </a:xfrm>
         </p:spPr>
         <p:txBody>
-          <a:bodyPr>
-            <a:normAutofit/>
-          </a:bodyPr>
-          <a:lstStyle/>
-          <a:p>
+          <a:bodyPr anchor="ctr"/>
+          <a:lstStyle/>
+          <a:p>
+            <a:pPr marL="342900" indent="-342900" algn="l">
+              <a:buFont typeface="Arial" panose="020B0604020202020204" pitchFamily="34" charset="0"/>
+              <a:buChar char="•"/>
+            </a:pPr>
             <a:r>
               <a:rPr lang="en-US" dirty="0"/>
-              <a:t>INFO ON EXTRACTING</a:t>
+              <a:t>CONTENT HERE</a:t>
             </a:r>
           </a:p>
         </p:txBody>
@@ -8128,7 +9070,7 @@
     </p:spTree>
     <p:extLst>
       <p:ext uri="{BB962C8B-B14F-4D97-AF65-F5344CB8AC3E}">
-        <p14:creationId xmlns:p14="http://schemas.microsoft.com/office/powerpoint/2010/main" val="1083437823"/>
+        <p14:creationId xmlns:p14="http://schemas.microsoft.com/office/powerpoint/2010/main" val="3585142905"/>
       </p:ext>
     </p:extLst>
   </p:cSld>
@@ -8160,7 +9102,7 @@
           <p:cNvPr id="2" name="Title 1">
             <a:extLst>
               <a:ext uri="{FF2B5EF4-FFF2-40B4-BE49-F238E27FC236}">
-                <a16:creationId xmlns:a16="http://schemas.microsoft.com/office/drawing/2014/main" id="{1CD77767-1B4D-41A7-973F-7135FBE63F75}"/>
+                <a16:creationId xmlns:a16="http://schemas.microsoft.com/office/drawing/2014/main" id="{DF2314C0-5399-49F6-8AD6-87EDDFF32150}"/>
               </a:ext>
             </a:extLst>
           </p:cNvPr>
@@ -8173,33 +9115,33 @@
         </p:nvSpPr>
         <p:spPr>
           <a:xfrm>
-            <a:off x="1630624" y="373023"/>
-            <a:ext cx="8930747" cy="936488"/>
+            <a:off x="1577075" y="162340"/>
+            <a:ext cx="10018713" cy="559904"/>
           </a:xfrm>
         </p:spPr>
         <p:txBody>
-          <a:bodyPr anchor="t">
-            <a:noAutofit/>
+          <a:bodyPr>
+            <a:normAutofit/>
           </a:bodyPr>
           <a:lstStyle/>
           <a:p>
             <a:pPr algn="l"/>
             <a:r>
-              <a:rPr lang="en-US" sz="2800" dirty="0">
+              <a:rPr lang="en-US" sz="2400" dirty="0">
                 <a:latin typeface="Calibri" panose="020F0502020204030204" pitchFamily="34" charset="0"/>
               </a:rPr>
-              <a:t>Extracting</a:t>
-            </a:r>
-            <a:endParaRPr lang="en-US" sz="2800" dirty="0"/>
-          </a:p>
-        </p:txBody>
-      </p:sp>
-      <p:sp>
-        <p:nvSpPr>
-          <p:cNvPr id="3" name="Text Placeholder 2">
+              <a:t>Approach 1 - Extracting</a:t>
+            </a:r>
+            <a:endParaRPr lang="en-US" sz="2400" dirty="0"/>
+          </a:p>
+        </p:txBody>
+      </p:sp>
+      <p:sp>
+        <p:nvSpPr>
+          <p:cNvPr id="3" name="Content Placeholder 2">
             <a:extLst>
               <a:ext uri="{FF2B5EF4-FFF2-40B4-BE49-F238E27FC236}">
-                <a16:creationId xmlns:a16="http://schemas.microsoft.com/office/drawing/2014/main" id="{23F62359-DE82-4A1D-9D06-C5B2423B7694}"/>
+                <a16:creationId xmlns:a16="http://schemas.microsoft.com/office/drawing/2014/main" id="{24420B42-4123-42C4-A3EE-B8CED6810E04}"/>
               </a:ext>
             </a:extLst>
           </p:cNvPr>
@@ -8207,26 +9149,24 @@
             <a:spLocks noGrp="1"/>
           </p:cNvSpPr>
           <p:nvPr>
-            <p:ph type="body" idx="1"/>
+            <p:ph idx="1"/>
           </p:nvPr>
         </p:nvSpPr>
         <p:spPr>
           <a:xfrm>
-            <a:off x="1630624" y="2348089"/>
-            <a:ext cx="8930747" cy="3200400"/>
+            <a:off x="1577075" y="1249920"/>
+            <a:ext cx="10018713" cy="4358159"/>
           </a:xfrm>
         </p:spPr>
         <p:txBody>
-          <a:bodyPr anchor="ctr"/>
-          <a:lstStyle/>
-          <a:p>
-            <a:pPr marL="342900" indent="-342900" algn="l">
-              <a:buFont typeface="Arial" panose="020B0604020202020204" pitchFamily="34" charset="0"/>
-              <a:buChar char="•"/>
-            </a:pPr>
+          <a:bodyPr>
+            <a:normAutofit/>
+          </a:bodyPr>
+          <a:lstStyle/>
+          <a:p>
             <a:r>
               <a:rPr lang="en-US" dirty="0"/>
-              <a:t>CONTENT HERE</a:t>
+              <a:t>INFO ON EXTRACTING</a:t>
             </a:r>
           </a:p>
         </p:txBody>
@@ -8234,7 +9174,7 @@
     </p:spTree>
     <p:extLst>
       <p:ext uri="{BB962C8B-B14F-4D97-AF65-F5344CB8AC3E}">
-        <p14:creationId xmlns:p14="http://schemas.microsoft.com/office/powerpoint/2010/main" val="2799158175"/>
+        <p14:creationId xmlns:p14="http://schemas.microsoft.com/office/powerpoint/2010/main" val="1083437823"/>
       </p:ext>
     </p:extLst>
   </p:cSld>
@@ -8294,7 +9234,7 @@
               <a:rPr lang="en-US" sz="2400" dirty="0">
                 <a:latin typeface="Calibri" panose="020F0502020204030204" pitchFamily="34" charset="0"/>
               </a:rPr>
-              <a:t>Extracting</a:t>
+              <a:t>Approach 1 - Transforming</a:t>
             </a:r>
             <a:endParaRPr lang="en-US" sz="2400" dirty="0"/>
           </a:p>
@@ -8338,7 +9278,7 @@
     </p:spTree>
     <p:extLst>
       <p:ext uri="{BB962C8B-B14F-4D97-AF65-F5344CB8AC3E}">
-        <p14:creationId xmlns:p14="http://schemas.microsoft.com/office/powerpoint/2010/main" val="3951995029"/>
+        <p14:creationId xmlns:p14="http://schemas.microsoft.com/office/powerpoint/2010/main" val="3239347302"/>
       </p:ext>
     </p:extLst>
   </p:cSld>
@@ -8370,7 +9310,7 @@
           <p:cNvPr id="2" name="Title 1">
             <a:extLst>
               <a:ext uri="{FF2B5EF4-FFF2-40B4-BE49-F238E27FC236}">
-                <a16:creationId xmlns:a16="http://schemas.microsoft.com/office/drawing/2014/main" id="{1CD77767-1B4D-41A7-973F-7135FBE63F75}"/>
+                <a16:creationId xmlns:a16="http://schemas.microsoft.com/office/drawing/2014/main" id="{DF2314C0-5399-49F6-8AD6-87EDDFF32150}"/>
               </a:ext>
             </a:extLst>
           </p:cNvPr>
@@ -8383,33 +9323,33 @@
         </p:nvSpPr>
         <p:spPr>
           <a:xfrm>
-            <a:off x="1630624" y="373023"/>
-            <a:ext cx="8930747" cy="936488"/>
+            <a:off x="1577075" y="162340"/>
+            <a:ext cx="10018713" cy="559904"/>
           </a:xfrm>
         </p:spPr>
         <p:txBody>
-          <a:bodyPr anchor="t">
-            <a:noAutofit/>
+          <a:bodyPr>
+            <a:normAutofit/>
           </a:bodyPr>
           <a:lstStyle/>
           <a:p>
             <a:pPr algn="l"/>
             <a:r>
-              <a:rPr lang="en-US" sz="2800" dirty="0">
+              <a:rPr lang="en-US" sz="2400" dirty="0">
                 <a:latin typeface="Calibri" panose="020F0502020204030204" pitchFamily="34" charset="0"/>
               </a:rPr>
-              <a:t>Extracting</a:t>
-            </a:r>
-            <a:endParaRPr lang="en-US" sz="2800" dirty="0"/>
-          </a:p>
-        </p:txBody>
-      </p:sp>
-      <p:sp>
-        <p:nvSpPr>
-          <p:cNvPr id="3" name="Text Placeholder 2">
+              <a:t>Approach 1 - Loading</a:t>
+            </a:r>
+            <a:endParaRPr lang="en-US" sz="2400" dirty="0"/>
+          </a:p>
+        </p:txBody>
+      </p:sp>
+      <p:sp>
+        <p:nvSpPr>
+          <p:cNvPr id="3" name="Content Placeholder 2">
             <a:extLst>
               <a:ext uri="{FF2B5EF4-FFF2-40B4-BE49-F238E27FC236}">
-                <a16:creationId xmlns:a16="http://schemas.microsoft.com/office/drawing/2014/main" id="{23F62359-DE82-4A1D-9D06-C5B2423B7694}"/>
+                <a16:creationId xmlns:a16="http://schemas.microsoft.com/office/drawing/2014/main" id="{24420B42-4123-42C4-A3EE-B8CED6810E04}"/>
               </a:ext>
             </a:extLst>
           </p:cNvPr>
@@ -8417,26 +9357,24 @@
             <a:spLocks noGrp="1"/>
           </p:cNvSpPr>
           <p:nvPr>
-            <p:ph type="body" idx="1"/>
+            <p:ph idx="1"/>
           </p:nvPr>
         </p:nvSpPr>
         <p:spPr>
           <a:xfrm>
-            <a:off x="1630624" y="2348089"/>
-            <a:ext cx="8930747" cy="3200400"/>
+            <a:off x="1577075" y="1249920"/>
+            <a:ext cx="10018713" cy="4358159"/>
           </a:xfrm>
         </p:spPr>
         <p:txBody>
-          <a:bodyPr anchor="ctr"/>
-          <a:lstStyle/>
-          <a:p>
-            <a:pPr marL="342900" indent="-342900" algn="l">
-              <a:buFont typeface="Arial" panose="020B0604020202020204" pitchFamily="34" charset="0"/>
-              <a:buChar char="•"/>
-            </a:pPr>
+          <a:bodyPr>
+            <a:normAutofit/>
+          </a:bodyPr>
+          <a:lstStyle/>
+          <a:p>
             <a:r>
               <a:rPr lang="en-US" dirty="0"/>
-              <a:t>CONTENT HERE</a:t>
+              <a:t>INFO ON EXTRACTING</a:t>
             </a:r>
           </a:p>
         </p:txBody>
@@ -8444,7 +9382,7 @@
     </p:spTree>
     <p:extLst>
       <p:ext uri="{BB962C8B-B14F-4D97-AF65-F5344CB8AC3E}">
-        <p14:creationId xmlns:p14="http://schemas.microsoft.com/office/powerpoint/2010/main" val="3204984208"/>
+        <p14:creationId xmlns:p14="http://schemas.microsoft.com/office/powerpoint/2010/main" val="2849956186"/>
       </p:ext>
     </p:extLst>
   </p:cSld>

</xml_diff>